<commit_message>
update changes for day2
</commit_message>
<xml_diff>
--- a/workshop.pptx
+++ b/workshop.pptx
@@ -273,7 +273,7 @@
           <a:p>
             <a:fld id="{9F0A2C06-9025-4D76-B3EF-265CE2A6784A}" type="datetimeFigureOut">
               <a:rPr lang="en-US" smtClean="0"/>
-              <a:t>12/8/2019</a:t>
+              <a:t>1/14/2020</a:t>
             </a:fld>
             <a:endParaRPr lang="en-US"/>
           </a:p>
@@ -473,7 +473,7 @@
           <a:p>
             <a:fld id="{9F0A2C06-9025-4D76-B3EF-265CE2A6784A}" type="datetimeFigureOut">
               <a:rPr lang="en-US" smtClean="0"/>
-              <a:t>12/8/2019</a:t>
+              <a:t>1/14/2020</a:t>
             </a:fld>
             <a:endParaRPr lang="en-US"/>
           </a:p>
@@ -683,7 +683,7 @@
           <a:p>
             <a:fld id="{9F0A2C06-9025-4D76-B3EF-265CE2A6784A}" type="datetimeFigureOut">
               <a:rPr lang="en-US" smtClean="0"/>
-              <a:t>12/8/2019</a:t>
+              <a:t>1/14/2020</a:t>
             </a:fld>
             <a:endParaRPr lang="en-US"/>
           </a:p>
@@ -883,7 +883,7 @@
           <a:p>
             <a:fld id="{9F0A2C06-9025-4D76-B3EF-265CE2A6784A}" type="datetimeFigureOut">
               <a:rPr lang="en-US" smtClean="0"/>
-              <a:t>12/8/2019</a:t>
+              <a:t>1/14/2020</a:t>
             </a:fld>
             <a:endParaRPr lang="en-US"/>
           </a:p>
@@ -1159,7 +1159,7 @@
           <a:p>
             <a:fld id="{9F0A2C06-9025-4D76-B3EF-265CE2A6784A}" type="datetimeFigureOut">
               <a:rPr lang="en-US" smtClean="0"/>
-              <a:t>12/8/2019</a:t>
+              <a:t>1/14/2020</a:t>
             </a:fld>
             <a:endParaRPr lang="en-US"/>
           </a:p>
@@ -1427,7 +1427,7 @@
           <a:p>
             <a:fld id="{9F0A2C06-9025-4D76-B3EF-265CE2A6784A}" type="datetimeFigureOut">
               <a:rPr lang="en-US" smtClean="0"/>
-              <a:t>12/8/2019</a:t>
+              <a:t>1/14/2020</a:t>
             </a:fld>
             <a:endParaRPr lang="en-US"/>
           </a:p>
@@ -1842,7 +1842,7 @@
           <a:p>
             <a:fld id="{9F0A2C06-9025-4D76-B3EF-265CE2A6784A}" type="datetimeFigureOut">
               <a:rPr lang="en-US" smtClean="0"/>
-              <a:t>12/8/2019</a:t>
+              <a:t>1/14/2020</a:t>
             </a:fld>
             <a:endParaRPr lang="en-US"/>
           </a:p>
@@ -1984,7 +1984,7 @@
           <a:p>
             <a:fld id="{9F0A2C06-9025-4D76-B3EF-265CE2A6784A}" type="datetimeFigureOut">
               <a:rPr lang="en-US" smtClean="0"/>
-              <a:t>12/8/2019</a:t>
+              <a:t>1/14/2020</a:t>
             </a:fld>
             <a:endParaRPr lang="en-US"/>
           </a:p>
@@ -2097,7 +2097,7 @@
           <a:p>
             <a:fld id="{9F0A2C06-9025-4D76-B3EF-265CE2A6784A}" type="datetimeFigureOut">
               <a:rPr lang="en-US" smtClean="0"/>
-              <a:t>12/8/2019</a:t>
+              <a:t>1/14/2020</a:t>
             </a:fld>
             <a:endParaRPr lang="en-US"/>
           </a:p>
@@ -2410,7 +2410,7 @@
           <a:p>
             <a:fld id="{9F0A2C06-9025-4D76-B3EF-265CE2A6784A}" type="datetimeFigureOut">
               <a:rPr lang="en-US" smtClean="0"/>
-              <a:t>12/8/2019</a:t>
+              <a:t>1/14/2020</a:t>
             </a:fld>
             <a:endParaRPr lang="en-US"/>
           </a:p>
@@ -2699,7 +2699,7 @@
           <a:p>
             <a:fld id="{9F0A2C06-9025-4D76-B3EF-265CE2A6784A}" type="datetimeFigureOut">
               <a:rPr lang="en-US" smtClean="0"/>
-              <a:t>12/8/2019</a:t>
+              <a:t>1/14/2020</a:t>
             </a:fld>
             <a:endParaRPr lang="en-US"/>
           </a:p>
@@ -2942,7 +2942,7 @@
           <a:p>
             <a:fld id="{9F0A2C06-9025-4D76-B3EF-265CE2A6784A}" type="datetimeFigureOut">
               <a:rPr lang="en-US" smtClean="0"/>
-              <a:t>12/8/2019</a:t>
+              <a:t>1/14/2020</a:t>
             </a:fld>
             <a:endParaRPr lang="en-US"/>
           </a:p>
@@ -3406,7 +3406,7 @@
 </file>
 
 <file path=ppt/slides/slide10.xml><?xml version="1.0" encoding="utf-8"?>
-<p:sld xmlns:a="http://schemas.openxmlformats.org/drawingml/2006/main" xmlns:r="http://schemas.openxmlformats.org/officeDocument/2006/relationships" xmlns:p="http://schemas.openxmlformats.org/presentationml/2006/main">
+<p:sld xmlns:a="http://schemas.openxmlformats.org/drawingml/2006/main" xmlns:r="http://schemas.openxmlformats.org/officeDocument/2006/relationships" xmlns:p="http://schemas.openxmlformats.org/presentationml/2006/main" show="0">
   <p:cSld>
     <p:spTree>
       <p:nvGrpSpPr>
@@ -5542,8 +5542,8 @@
           </a:p>
         </p:txBody>
       </p:sp>
-      <mc:AlternateContent xmlns:mc="http://schemas.openxmlformats.org/markup-compatibility/2006">
-        <mc:Choice xmlns:a14="http://schemas.microsoft.com/office/drawing/2010/main" Requires="a14">
+      <mc:AlternateContent xmlns:mc="http://schemas.openxmlformats.org/markup-compatibility/2006" xmlns:a14="http://schemas.microsoft.com/office/drawing/2010/main">
+        <mc:Choice Requires="a14">
           <p:sp>
             <p:nvSpPr>
               <p:cNvPr id="52" name="กล่องข้อความ 51">
@@ -5572,6 +5572,7 @@
               </a:bodyPr>
               <a:lstStyle/>
               <a:p>
+                <a:pPr/>
                 <a14:m>
                   <m:oMathPara xmlns:m="http://schemas.openxmlformats.org/officeDocument/2006/math">
                     <m:oMathParaPr>
@@ -5762,7 +5763,7 @@
                             <m:t>=</m:t>
                           </m:r>
                           <m:r>
-                            <a:rPr lang="en-US" b="0" i="1" smtClean="0">
+                            <a:rPr lang="en-US" i="1" smtClean="0">
                               <a:latin typeface="Cambria Math" panose="02040503050406030204" pitchFamily="18" charset="0"/>
                             </a:rPr>
                             <m:t>2</m:t>
@@ -5904,7 +5905,7 @@
             </p:txBody>
           </p:sp>
         </mc:Choice>
-        <mc:Fallback>
+        <mc:Fallback xmlns="">
           <p:sp>
             <p:nvSpPr>
               <p:cNvPr id="52" name="กล่องข้อความ 51">
@@ -5949,8 +5950,8 @@
           </p:sp>
         </mc:Fallback>
       </mc:AlternateContent>
-      <mc:AlternateContent xmlns:mc="http://schemas.openxmlformats.org/markup-compatibility/2006">
-        <mc:Choice xmlns:a14="http://schemas.microsoft.com/office/drawing/2010/main" Requires="a14">
+      <mc:AlternateContent xmlns:mc="http://schemas.openxmlformats.org/markup-compatibility/2006" xmlns:a14="http://schemas.microsoft.com/office/drawing/2010/main">
+        <mc:Choice Requires="a14">
           <p:sp>
             <p:nvSpPr>
               <p:cNvPr id="53" name="กล่องข้อความ 52">
@@ -5979,6 +5980,7 @@
               </a:bodyPr>
               <a:lstStyle/>
               <a:p>
+                <a:pPr/>
                 <a14:m>
                   <m:oMathPara xmlns:m="http://schemas.openxmlformats.org/officeDocument/2006/math">
                     <m:oMathParaPr>
@@ -6182,7 +6184,7 @@
                             <m:t>=</m:t>
                           </m:r>
                           <m:r>
-                            <a:rPr lang="en-US" sz="1600" b="0" i="1" smtClean="0">
+                            <a:rPr lang="en-US" sz="1600" i="1" smtClean="0">
                               <a:latin typeface="Cambria Math" panose="02040503050406030204" pitchFamily="18" charset="0"/>
                             </a:rPr>
                             <m:t>1</m:t>
@@ -6250,7 +6252,7 @@
             </p:txBody>
           </p:sp>
         </mc:Choice>
-        <mc:Fallback>
+        <mc:Fallback xmlns="">
           <p:sp>
             <p:nvSpPr>
               <p:cNvPr id="53" name="กล่องข้อความ 52">
@@ -6295,8 +6297,8 @@
           </p:sp>
         </mc:Fallback>
       </mc:AlternateContent>
-      <mc:AlternateContent xmlns:mc="http://schemas.openxmlformats.org/markup-compatibility/2006">
-        <mc:Choice xmlns:a14="http://schemas.microsoft.com/office/drawing/2010/main" Requires="a14">
+      <mc:AlternateContent xmlns:mc="http://schemas.openxmlformats.org/markup-compatibility/2006" xmlns:a14="http://schemas.microsoft.com/office/drawing/2010/main">
+        <mc:Choice Requires="a14">
           <p:sp>
             <p:nvSpPr>
               <p:cNvPr id="54" name="กล่องข้อความ 53">
@@ -6325,6 +6327,7 @@
               </a:bodyPr>
               <a:lstStyle/>
               <a:p>
+                <a:pPr/>
                 <a14:m>
                   <m:oMathPara xmlns:m="http://schemas.openxmlformats.org/officeDocument/2006/math">
                     <m:oMathParaPr>
@@ -6571,7 +6574,7 @@
                             <m:t>=</m:t>
                           </m:r>
                           <m:r>
-                            <a:rPr lang="en-US" sz="1600" b="0" i="1" smtClean="0">
+                            <a:rPr lang="en-US" sz="1600" i="1" smtClean="0">
                               <a:latin typeface="Cambria Math" panose="02040503050406030204" pitchFamily="18" charset="0"/>
                             </a:rPr>
                             <m:t>2</m:t>
@@ -6682,7 +6685,7 @@
             </p:txBody>
           </p:sp>
         </mc:Choice>
-        <mc:Fallback>
+        <mc:Fallback xmlns="">
           <p:sp>
             <p:nvSpPr>
               <p:cNvPr id="54" name="กล่องข้อความ 53">
@@ -6727,8 +6730,8 @@
           </p:sp>
         </mc:Fallback>
       </mc:AlternateContent>
-      <mc:AlternateContent xmlns:mc="http://schemas.openxmlformats.org/markup-compatibility/2006">
-        <mc:Choice xmlns:a14="http://schemas.microsoft.com/office/drawing/2010/main" Requires="a14">
+      <mc:AlternateContent xmlns:mc="http://schemas.openxmlformats.org/markup-compatibility/2006" xmlns:a14="http://schemas.microsoft.com/office/drawing/2010/main">
+        <mc:Choice Requires="a14">
           <p:sp>
             <p:nvSpPr>
               <p:cNvPr id="55" name="กล่องข้อความ 54">
@@ -6757,6 +6760,7 @@
               </a:bodyPr>
               <a:lstStyle/>
               <a:p>
+                <a:pPr/>
                 <a14:m>
                   <m:oMathPara xmlns:m="http://schemas.openxmlformats.org/officeDocument/2006/math">
                     <m:oMathParaPr>
@@ -7003,7 +7007,7 @@
                             <m:t>=</m:t>
                           </m:r>
                           <m:r>
-                            <a:rPr lang="en-US" sz="1600" b="0" i="1" smtClean="0">
+                            <a:rPr lang="en-US" sz="1600" i="1" smtClean="0">
                               <a:latin typeface="Cambria Math" panose="02040503050406030204" pitchFamily="18" charset="0"/>
                             </a:rPr>
                             <m:t>3</m:t>
@@ -7134,7 +7138,7 @@
                                 <m:t>−</m:t>
                               </m:r>
                               <m:r>
-                                <a:rPr lang="en-US" sz="1600" b="0" i="1" smtClean="0">
+                                <a:rPr lang="en-US" sz="1600" i="1">
                                   <a:latin typeface="Cambria Math" panose="02040503050406030204" pitchFamily="18" charset="0"/>
                                 </a:rPr>
                                 <m:t>2</m:t>
@@ -7157,7 +7161,7 @@
             </p:txBody>
           </p:sp>
         </mc:Choice>
-        <mc:Fallback>
+        <mc:Fallback xmlns="">
           <p:sp>
             <p:nvSpPr>
               <p:cNvPr id="55" name="กล่องข้อความ 54">
@@ -8234,6 +8238,48 @@
           </a:p>
         </p:txBody>
       </p:sp>
+      <p:sp>
+        <p:nvSpPr>
+          <p:cNvPr id="4" name="กล่องข้อความ 3">
+            <a:extLst>
+              <a:ext uri="{FF2B5EF4-FFF2-40B4-BE49-F238E27FC236}">
+                <a16:creationId xmlns:a16="http://schemas.microsoft.com/office/drawing/2014/main" id="{F8D940BB-3217-4A3F-8B2B-0662572B95D4}"/>
+              </a:ext>
+            </a:extLst>
+          </p:cNvPr>
+          <p:cNvSpPr txBox="1"/>
+          <p:nvPr/>
+        </p:nvSpPr>
+        <p:spPr>
+          <a:xfrm>
+            <a:off x="339458" y="6160654"/>
+            <a:ext cx="5511445" cy="369332"/>
+          </a:xfrm>
+          <a:prstGeom prst="rect">
+            <a:avLst/>
+          </a:prstGeom>
+          <a:noFill/>
+        </p:spPr>
+        <p:txBody>
+          <a:bodyPr wrap="none" rtlCol="0">
+            <a:spAutoFit/>
+          </a:bodyPr>
+          <a:lstStyle/>
+          <a:p>
+            <a:r>
+              <a:rPr lang="en-US" dirty="0"/>
+              <a:t>Materials: </a:t>
+            </a:r>
+            <a:r>
+              <a:rPr lang="en-US" dirty="0">
+                <a:hlinkClick r:id="rId2"/>
+              </a:rPr>
+              <a:t>https://github.com/Music-Wandee/Workshop</a:t>
+            </a:r>
+            <a:endParaRPr lang="en-US" dirty="0"/>
+          </a:p>
+        </p:txBody>
+      </p:sp>
     </p:spTree>
     <p:extLst>
       <p:ext uri="{BB962C8B-B14F-4D97-AF65-F5344CB8AC3E}">
@@ -8679,8 +8725,8 @@
         </p:nvSpPr>
         <p:spPr>
           <a:xfrm>
-            <a:off x="260684" y="6282808"/>
-            <a:ext cx="6322996" cy="453975"/>
+            <a:off x="260684" y="6192516"/>
+            <a:ext cx="6322996" cy="386936"/>
           </a:xfrm>
           <a:prstGeom prst="rect">
             <a:avLst/>
@@ -15007,7 +15053,7 @@
 </file>
 
 <file path=ppt/slides/slide9.xml><?xml version="1.0" encoding="utf-8"?>
-<p:sld xmlns:a="http://schemas.openxmlformats.org/drawingml/2006/main" xmlns:r="http://schemas.openxmlformats.org/officeDocument/2006/relationships" xmlns:p="http://schemas.openxmlformats.org/presentationml/2006/main">
+<p:sld xmlns:a="http://schemas.openxmlformats.org/drawingml/2006/main" xmlns:r="http://schemas.openxmlformats.org/officeDocument/2006/relationships" xmlns:p="http://schemas.openxmlformats.org/presentationml/2006/main" show="0">
   <p:cSld>
     <p:spTree>
       <p:nvGrpSpPr>

</xml_diff>